<commit_message>
PID and updated Gyro and Proportional Control
</commit_message>
<xml_diff>
--- a/en/ProgrammingLessons/advanced/Gyro.pptx
+++ b/en/ProgrammingLessons/advanced/Gyro.pptx
@@ -223,7 +223,7 @@
           <a:p>
             <a:fld id="{E354B44E-40A3-0E46-B16A-9BF1250A248B}" type="datetimeFigureOut">
               <a:rPr lang="en-US" smtClean="0"/>
-              <a:t>12/21/18</a:t>
+              <a:t>7/17/19</a:t>
             </a:fld>
             <a:endParaRPr lang="en-US"/>
           </a:p>
@@ -389,7 +389,7 @@
           <a:p>
             <a:fld id="{C86AD16C-2DB4-6642-BAD4-9ED973A087A0}" type="datetimeFigureOut">
               <a:rPr lang="en-US" smtClean="0"/>
-              <a:t>12/21/18</a:t>
+              <a:t>7/17/19</a:t>
             </a:fld>
             <a:endParaRPr lang="en-US"/>
           </a:p>
@@ -1027,7 +1027,7 @@
           <a:p>
             <a:fld id="{B8CD61EB-86A7-2143-909A-671FBD4CCD5D}" type="datetime1">
               <a:rPr lang="en-US" smtClean="0"/>
-              <a:t>12/21/18</a:t>
+              <a:t>7/17/19</a:t>
             </a:fld>
             <a:endParaRPr lang="en-US"/>
           </a:p>
@@ -1573,7 +1573,7 @@
           <a:noFill/>
           <a:extLst>
             <a:ext uri="{909E8E84-426E-40dd-AFC4-6F175D3DCCD1}">
-              <a14:hiddenFill xmlns="" xmlns:a14="http://schemas.microsoft.com/office/drawing/2010/main">
+              <a14:hiddenFill xmlns:a14="http://schemas.microsoft.com/office/drawing/2010/main" xmlns="">
                 <a:solidFill>
                   <a:srgbClr val="FFFFFF"/>
                 </a:solidFill>
@@ -1720,7 +1720,7 @@
           <a:p>
             <a:fld id="{C100E592-9121-CD4C-A5D0-650E85B01007}" type="datetime1">
               <a:rPr lang="en-US" smtClean="0"/>
-              <a:t>12/21/18</a:t>
+              <a:t>7/17/19</a:t>
             </a:fld>
             <a:endParaRPr lang="en-US"/>
           </a:p>
@@ -2174,7 +2174,7 @@
           <a:p>
             <a:fld id="{D17434C9-5DD5-BC42-8D00-C95AA05F9490}" type="datetime1">
               <a:rPr lang="en-US" smtClean="0"/>
-              <a:t>12/21/18</a:t>
+              <a:t>7/17/19</a:t>
             </a:fld>
             <a:endParaRPr lang="en-US" dirty="0"/>
           </a:p>
@@ -2631,7 +2631,7 @@
           <a:p>
             <a:fld id="{3765F00A-3677-6146-BF75-826889CCEDCA}" type="datetime1">
               <a:rPr lang="en-US" smtClean="0"/>
-              <a:t>12/21/18</a:t>
+              <a:t>7/17/19</a:t>
             </a:fld>
             <a:endParaRPr lang="en-US"/>
           </a:p>
@@ -3348,7 +3348,7 @@
           <a:p>
             <a:fld id="{540F61AE-1C41-BA4F-9947-B9B43E7ACD59}" type="datetime1">
               <a:rPr lang="en-US" smtClean="0"/>
-              <a:t>12/21/18</a:t>
+              <a:t>7/17/19</a:t>
             </a:fld>
             <a:endParaRPr lang="en-US"/>
           </a:p>
@@ -3622,7 +3622,7 @@
           <a:p>
             <a:fld id="{A54BB882-2478-FE4A-881F-E1C11FF9B456}" type="datetime1">
               <a:rPr lang="en-US" smtClean="0"/>
-              <a:t>12/21/18</a:t>
+              <a:t>7/17/19</a:t>
             </a:fld>
             <a:endParaRPr lang="en-US"/>
           </a:p>
@@ -3935,7 +3935,7 @@
           <a:p>
             <a:fld id="{A561762A-4F54-4640-B80B-2E9A9CC9D637}" type="datetime1">
               <a:rPr lang="en-US" smtClean="0"/>
-              <a:t>12/21/18</a:t>
+              <a:t>7/17/19</a:t>
             </a:fld>
             <a:endParaRPr lang="en-US"/>
           </a:p>
@@ -4155,7 +4155,7 @@
           <a:p>
             <a:fld id="{809B2184-06D6-3E4E-9390-0071FDC72B08}" type="datetime1">
               <a:rPr lang="en-US" smtClean="0"/>
-              <a:t>12/21/18</a:t>
+              <a:t>7/17/19</a:t>
             </a:fld>
             <a:endParaRPr lang="en-US"/>
           </a:p>
@@ -4434,7 +4434,7 @@
           <a:p>
             <a:fld id="{8798BFBC-4682-9247-893E-49B2B25445E9}" type="datetime1">
               <a:rPr lang="en-US" smtClean="0"/>
-              <a:t>12/21/18</a:t>
+              <a:t>7/17/19</a:t>
             </a:fld>
             <a:endParaRPr lang="en-US" dirty="0"/>
           </a:p>
@@ -4677,7 +4677,7 @@
           <a:p>
             <a:fld id="{251916C3-5C55-6842-81BB-4BDA5AEB10B6}" type="datetime1">
               <a:rPr lang="en-US" smtClean="0"/>
-              <a:t>12/21/18</a:t>
+              <a:t>7/17/19</a:t>
             </a:fld>
             <a:endParaRPr lang="en-US" dirty="0"/>
           </a:p>
@@ -5463,7 +5463,7 @@
           <a:p>
             <a:fld id="{6193FD32-FB04-CD45-91B4-2D0C5581EDE3}" type="datetime1">
               <a:rPr lang="en-US" smtClean="0"/>
-              <a:t>12/21/18</a:t>
+              <a:t>7/17/19</a:t>
             </a:fld>
             <a:endParaRPr lang="en-US"/>
           </a:p>
@@ -5707,7 +5707,7 @@
           <a:p>
             <a:fld id="{576DC0FE-24C6-5542-B19C-469520102976}" type="datetime1">
               <a:rPr lang="en-US" smtClean="0"/>
-              <a:t>12/21/18</a:t>
+              <a:t>7/17/19</a:t>
             </a:fld>
             <a:endParaRPr lang="en-US"/>
           </a:p>
@@ -7562,7 +7562,7 @@
           <a:p>
             <a:fld id="{F9D1C0A9-2B1B-9943-A35C-2A04CA207E70}" type="datetime1">
               <a:rPr lang="en-US" smtClean="0"/>
-              <a:t>12/21/18</a:t>
+              <a:t>7/17/19</a:t>
             </a:fld>
             <a:endParaRPr lang="en-US"/>
           </a:p>
@@ -7760,7 +7760,7 @@
           <a:effectLst/>
           <a:extLst>
             <a:ext uri="{91240B29-F687-4f45-9708-019B960494DF}">
-              <a14:hiddenLine xmlns="" xmlns:a14="http://schemas.microsoft.com/office/drawing/2010/main" w="9525">
+              <a14:hiddenLine xmlns:a14="http://schemas.microsoft.com/office/drawing/2010/main" xmlns="" w="9525">
                 <a:solidFill>
                   <a:schemeClr val="tx1"/>
                 </a:solidFill>
@@ -7770,7 +7770,7 @@
               </a14:hiddenLine>
             </a:ext>
             <a:ext uri="{AF507438-7753-43e0-B8FC-AC1667EBCBE1}">
-              <a14:hiddenEffects xmlns="" xmlns:a14="http://schemas.microsoft.com/office/drawing/2010/main">
+              <a14:hiddenEffects xmlns:a14="http://schemas.microsoft.com/office/drawing/2010/main" xmlns="">
                 <a:effectLst>
                   <a:outerShdw dist="35921" dir="2700000" algn="ctr" rotWithShape="0">
                     <a:schemeClr val="bg2"/>
@@ -8111,7 +8111,7 @@
           <a:noFill/>
           <a:extLst>
             <a:ext uri="{909E8E84-426E-40dd-AFC4-6F175D3DCCD1}">
-              <a14:hiddenFill xmlns="" xmlns:a14="http://schemas.microsoft.com/office/drawing/2010/main">
+              <a14:hiddenFill xmlns:a14="http://schemas.microsoft.com/office/drawing/2010/main" xmlns="">
                 <a:solidFill>
                   <a:srgbClr val="FFFFFF"/>
                 </a:solidFill>
@@ -8137,7 +8137,7 @@
           <a:p>
             <a:fld id="{CD848738-2DDE-9B42-91A4-B9D48A936005}" type="datetime1">
               <a:rPr lang="en-US" smtClean="0"/>
-              <a:t>12/21/18</a:t>
+              <a:t>7/17/19</a:t>
             </a:fld>
             <a:endParaRPr lang="en-US"/>
           </a:p>
@@ -8954,7 +8954,7 @@
           <a:p>
             <a:fld id="{504049EF-DCAF-B14F-ACA0-1EE592A878A0}" type="datetime1">
               <a:rPr lang="en-US" smtClean="0"/>
-              <a:t>12/21/18</a:t>
+              <a:t>7/17/19</a:t>
             </a:fld>
             <a:endParaRPr lang="en-US"/>
           </a:p>
@@ -9118,7 +9118,7 @@
           <a:p>
             <a:fld id="{7CAD3490-3091-EB47-9335-B171F325E32C}" type="datetime1">
               <a:rPr lang="en-US" smtClean="0"/>
-              <a:t>12/21/18</a:t>
+              <a:t>7/17/19</a:t>
             </a:fld>
             <a:endParaRPr lang="en-US"/>
           </a:p>
@@ -9321,7 +9321,7 @@
           <a:p>
             <a:fld id="{39D0E7D0-5543-9F4E-93A0-E7A4BCDF0F3E}" type="datetime1">
               <a:rPr lang="en-US" smtClean="0"/>
-              <a:t>12/21/18</a:t>
+              <a:t>7/17/19</a:t>
             </a:fld>
             <a:endParaRPr lang="en-US"/>
           </a:p>
@@ -9490,7 +9490,7 @@
           <a:p>
             <a:fld id="{AC895C39-8ECF-0843-A8DF-609EDBCEAE0B}" type="datetime1">
               <a:rPr lang="en-US" smtClean="0"/>
-              <a:t>12/21/18</a:t>
+              <a:t>7/17/19</a:t>
             </a:fld>
             <a:endParaRPr lang="en-US"/>
           </a:p>
@@ -9562,7 +9562,7 @@
         <p:spPr/>
         <p:txBody>
           <a:bodyPr>
-            <a:normAutofit fontScale="92500" lnSpcReduction="20000"/>
+            <a:normAutofit fontScale="92500"/>
           </a:bodyPr>
           <a:lstStyle/>
           <a:p>
@@ -9571,8 +9571,16 @@
               <a:buChar char="•"/>
             </a:pPr>
             <a:r>
+              <a:rPr lang="en-US" u="sng" dirty="0">
+                <a:solidFill>
+                  <a:srgbClr val="FF0000"/>
+                </a:solidFill>
+              </a:rPr>
+              <a:t>Keep the robot still </a:t>
+            </a:r>
+            <a:r>
               <a:rPr lang="en-US" dirty="0"/>
-              <a:t>The below are critical notes for using the gyro correctly!!!!!</a:t>
+              <a:t>when you calibrate the gyro</a:t>
             </a:r>
           </a:p>
           <a:p>
@@ -9582,7 +9590,19 @@
             </a:pPr>
             <a:r>
               <a:rPr lang="en-US" dirty="0"/>
-              <a:t>THE ROBOT MUST BE STILL WHEN YOU RUN ANY OF THESE CALIBRATION PROGRAMS!!!!</a:t>
+              <a:t>You </a:t>
+            </a:r>
+            <a:r>
+              <a:rPr lang="en-US" u="sng" dirty="0">
+                <a:solidFill>
+                  <a:srgbClr val="FF0000"/>
+                </a:solidFill>
+              </a:rPr>
+              <a:t>should not have not have to run this every time </a:t>
+            </a:r>
+            <a:r>
+              <a:rPr lang="en-US" dirty="0"/>
+              <a:t>you need to read the gyro</a:t>
             </a:r>
           </a:p>
           <a:p>
@@ -9592,7 +9612,27 @@
             </a:pPr>
             <a:r>
               <a:rPr lang="en-US" dirty="0"/>
-              <a:t>JUST LIKE THE COLOR CALIBRATION, YOU SHOULDN’T RUN THIS EVERY TIME YOU NEED TO READ THE GYRO. YOU SHOULD CALIBRATE IN A SEPARATE PROGRAM JUST BEFORE YOU RUN YOUR PROGRAM OR ONCE AT THE BEGINNING OF YOUR PROGRAM.</a:t>
+              <a:t>You should </a:t>
+            </a:r>
+            <a:r>
+              <a:rPr lang="en-US" u="sng" dirty="0">
+                <a:solidFill>
+                  <a:srgbClr val="FF0000"/>
+                </a:solidFill>
+              </a:rPr>
+              <a:t>calibrate in a separate program</a:t>
+            </a:r>
+            <a:r>
+              <a:rPr lang="en-US" dirty="0">
+                <a:solidFill>
+                  <a:srgbClr val="FF0000"/>
+                </a:solidFill>
+              </a:rPr>
+              <a:t> </a:t>
+            </a:r>
+            <a:r>
+              <a:rPr lang="en-US" dirty="0"/>
+              <a:t>and run it once before you run your code</a:t>
             </a:r>
           </a:p>
           <a:p>
@@ -10275,7 +10315,7 @@
           <a:p>
             <a:fld id="{3653A55C-FE01-F548-B391-70A4C4A8BBBD}" type="datetime1">
               <a:rPr lang="en-US" smtClean="0"/>
-              <a:t>12/21/18</a:t>
+              <a:t>7/17/19</a:t>
             </a:fld>
             <a:endParaRPr lang="en-US"/>
           </a:p>
@@ -10539,7 +10579,7 @@
           <a:p>
             <a:fld id="{C70C6FD9-D304-D74F-9512-2875B01280D3}" type="datetime1">
               <a:rPr lang="en-US" smtClean="0"/>
-              <a:t>12/21/18</a:t>
+              <a:t>7/17/19</a:t>
             </a:fld>
             <a:endParaRPr lang="en-US"/>
           </a:p>
@@ -10819,7 +10859,7 @@
           <a:p>
             <a:fld id="{3BFCB8D7-3BA4-784B-89B8-D4F821C20023}" type="datetime1">
               <a:rPr lang="en-US" smtClean="0"/>
-              <a:t>12/21/18</a:t>
+              <a:t>7/17/19</a:t>
             </a:fld>
             <a:endParaRPr lang="en-US"/>
           </a:p>
@@ -11364,7 +11404,7 @@
           <a:p>
             <a:fld id="{9C72BE0A-9816-CC47-B76D-60C66374C0D1}" type="datetime1">
               <a:rPr lang="en-US" smtClean="0"/>
-              <a:t>12/21/18</a:t>
+              <a:t>7/17/19</a:t>
             </a:fld>
             <a:endParaRPr lang="en-US"/>
           </a:p>

</xml_diff>